<commit_message>
new results after fix of walking
</commit_message>
<xml_diff>
--- a/report SVM handcrafted and PCA/IDENTIFICATION.pptx
+++ b/report SVM handcrafted and PCA/IDENTIFICATION.pptx
@@ -260,7 +260,7 @@
           <a:p>
             <a:fld id="{553A844F-FF5C-934C-B225-48B8FD889570}" type="datetimeFigureOut">
               <a:rPr lang="en-US" smtClean="0"/>
-              <a:t>11/2/2017</a:t>
+              <a:t>11/5/2017</a:t>
             </a:fld>
             <a:endParaRPr lang="en-US"/>
           </a:p>
@@ -430,7 +430,7 @@
           <a:p>
             <a:fld id="{553A844F-FF5C-934C-B225-48B8FD889570}" type="datetimeFigureOut">
               <a:rPr lang="en-US" smtClean="0"/>
-              <a:t>11/2/2017</a:t>
+              <a:t>11/5/2017</a:t>
             </a:fld>
             <a:endParaRPr lang="en-US"/>
           </a:p>
@@ -610,7 +610,7 @@
           <a:p>
             <a:fld id="{553A844F-FF5C-934C-B225-48B8FD889570}" type="datetimeFigureOut">
               <a:rPr lang="en-US" smtClean="0"/>
-              <a:t>11/2/2017</a:t>
+              <a:t>11/5/2017</a:t>
             </a:fld>
             <a:endParaRPr lang="en-US"/>
           </a:p>
@@ -780,7 +780,7 @@
           <a:p>
             <a:fld id="{553A844F-FF5C-934C-B225-48B8FD889570}" type="datetimeFigureOut">
               <a:rPr lang="en-US" smtClean="0"/>
-              <a:t>11/2/2017</a:t>
+              <a:t>11/5/2017</a:t>
             </a:fld>
             <a:endParaRPr lang="en-US"/>
           </a:p>
@@ -1026,7 +1026,7 @@
           <a:p>
             <a:fld id="{553A844F-FF5C-934C-B225-48B8FD889570}" type="datetimeFigureOut">
               <a:rPr lang="en-US" smtClean="0"/>
-              <a:t>11/2/2017</a:t>
+              <a:t>11/5/2017</a:t>
             </a:fld>
             <a:endParaRPr lang="en-US"/>
           </a:p>
@@ -1258,7 +1258,7 @@
           <a:p>
             <a:fld id="{553A844F-FF5C-934C-B225-48B8FD889570}" type="datetimeFigureOut">
               <a:rPr lang="en-US" smtClean="0"/>
-              <a:t>11/2/2017</a:t>
+              <a:t>11/5/2017</a:t>
             </a:fld>
             <a:endParaRPr lang="en-US"/>
           </a:p>
@@ -1625,7 +1625,7 @@
           <a:p>
             <a:fld id="{553A844F-FF5C-934C-B225-48B8FD889570}" type="datetimeFigureOut">
               <a:rPr lang="en-US" smtClean="0"/>
-              <a:t>11/2/2017</a:t>
+              <a:t>11/5/2017</a:t>
             </a:fld>
             <a:endParaRPr lang="en-US"/>
           </a:p>
@@ -1743,7 +1743,7 @@
           <a:p>
             <a:fld id="{553A844F-FF5C-934C-B225-48B8FD889570}" type="datetimeFigureOut">
               <a:rPr lang="en-US" smtClean="0"/>
-              <a:t>11/2/2017</a:t>
+              <a:t>11/5/2017</a:t>
             </a:fld>
             <a:endParaRPr lang="en-US"/>
           </a:p>
@@ -1838,7 +1838,7 @@
           <a:p>
             <a:fld id="{553A844F-FF5C-934C-B225-48B8FD889570}" type="datetimeFigureOut">
               <a:rPr lang="en-US" smtClean="0"/>
-              <a:t>11/2/2017</a:t>
+              <a:t>11/5/2017</a:t>
             </a:fld>
             <a:endParaRPr lang="en-US"/>
           </a:p>
@@ -2115,7 +2115,7 @@
           <a:p>
             <a:fld id="{553A844F-FF5C-934C-B225-48B8FD889570}" type="datetimeFigureOut">
               <a:rPr lang="en-US" smtClean="0"/>
-              <a:t>11/2/2017</a:t>
+              <a:t>11/5/2017</a:t>
             </a:fld>
             <a:endParaRPr lang="en-US"/>
           </a:p>
@@ -2368,7 +2368,7 @@
           <a:p>
             <a:fld id="{553A844F-FF5C-934C-B225-48B8FD889570}" type="datetimeFigureOut">
               <a:rPr lang="en-US" smtClean="0"/>
-              <a:t>11/2/2017</a:t>
+              <a:t>11/5/2017</a:t>
             </a:fld>
             <a:endParaRPr lang="en-US"/>
           </a:p>
@@ -2581,7 +2581,7 @@
           <a:p>
             <a:fld id="{553A844F-FF5C-934C-B225-48B8FD889570}" type="datetimeFigureOut">
               <a:rPr lang="en-US" smtClean="0"/>
-              <a:t>11/2/2017</a:t>
+              <a:t>11/5/2017</a:t>
             </a:fld>
             <a:endParaRPr lang="en-US"/>
           </a:p>
@@ -3092,12 +3092,48 @@
                 <a:tableStyleId>{5C22544A-7EE6-4342-B048-85BDC9FD1C3A}</a:tableStyleId>
               </a:tblPr>
               <a:tblGrid>
-                <a:gridCol w="2631776"/>
-                <a:gridCol w="1680247"/>
-                <a:gridCol w="1685365"/>
-                <a:gridCol w="1748118"/>
-                <a:gridCol w="1550894"/>
-                <a:gridCol w="1712258"/>
+                <a:gridCol w="2631776">
+                  <a:extLst>
+                    <a:ext uri="{9D8B030D-6E8A-4147-A177-3AD203B41FA5}">
+                      <a16:colId xmlns:a16="http://schemas.microsoft.com/office/drawing/2014/main" val="20000"/>
+                    </a:ext>
+                  </a:extLst>
+                </a:gridCol>
+                <a:gridCol w="1680247">
+                  <a:extLst>
+                    <a:ext uri="{9D8B030D-6E8A-4147-A177-3AD203B41FA5}">
+                      <a16:colId xmlns:a16="http://schemas.microsoft.com/office/drawing/2014/main" val="20001"/>
+                    </a:ext>
+                  </a:extLst>
+                </a:gridCol>
+                <a:gridCol w="1685365">
+                  <a:extLst>
+                    <a:ext uri="{9D8B030D-6E8A-4147-A177-3AD203B41FA5}">
+                      <a16:colId xmlns:a16="http://schemas.microsoft.com/office/drawing/2014/main" val="20002"/>
+                    </a:ext>
+                  </a:extLst>
+                </a:gridCol>
+                <a:gridCol w="1748118">
+                  <a:extLst>
+                    <a:ext uri="{9D8B030D-6E8A-4147-A177-3AD203B41FA5}">
+                      <a16:colId xmlns:a16="http://schemas.microsoft.com/office/drawing/2014/main" val="20003"/>
+                    </a:ext>
+                  </a:extLst>
+                </a:gridCol>
+                <a:gridCol w="1550894">
+                  <a:extLst>
+                    <a:ext uri="{9D8B030D-6E8A-4147-A177-3AD203B41FA5}">
+                      <a16:colId xmlns:a16="http://schemas.microsoft.com/office/drawing/2014/main" val="20004"/>
+                    </a:ext>
+                  </a:extLst>
+                </a:gridCol>
+                <a:gridCol w="1712258">
+                  <a:extLst>
+                    <a:ext uri="{9D8B030D-6E8A-4147-A177-3AD203B41FA5}">
+                      <a16:colId xmlns:a16="http://schemas.microsoft.com/office/drawing/2014/main" val="20005"/>
+                    </a:ext>
+                  </a:extLst>
+                </a:gridCol>
               </a:tblGrid>
               <a:tr h="370840">
                 <a:tc>
@@ -3217,6 +3253,11 @@
                   </a:txBody>
                   <a:tcPr/>
                 </a:tc>
+                <a:extLst>
+                  <a:ext uri="{0D108BD9-81ED-4DB2-BD59-A6C34878D82A}">
+                    <a16:rowId xmlns:a16="http://schemas.microsoft.com/office/drawing/2014/main" val="10000"/>
+                  </a:ext>
+                </a:extLst>
               </a:tr>
               <a:tr h="370840">
                 <a:tc>
@@ -3367,6 +3408,11 @@
                   </a:txBody>
                   <a:tcPr/>
                 </a:tc>
+                <a:extLst>
+                  <a:ext uri="{0D108BD9-81ED-4DB2-BD59-A6C34878D82A}">
+                    <a16:rowId xmlns:a16="http://schemas.microsoft.com/office/drawing/2014/main" val="10001"/>
+                  </a:ext>
+                </a:extLst>
               </a:tr>
               <a:tr h="370840">
                 <a:tc>
@@ -3534,6 +3580,11 @@
                   </a:txBody>
                   <a:tcPr/>
                 </a:tc>
+                <a:extLst>
+                  <a:ext uri="{0D108BD9-81ED-4DB2-BD59-A6C34878D82A}">
+                    <a16:rowId xmlns:a16="http://schemas.microsoft.com/office/drawing/2014/main" val="10002"/>
+                  </a:ext>
+                </a:extLst>
               </a:tr>
               <a:tr h="370840">
                 <a:tc>
@@ -3684,6 +3735,11 @@
                   </a:txBody>
                   <a:tcPr/>
                 </a:tc>
+                <a:extLst>
+                  <a:ext uri="{0D108BD9-81ED-4DB2-BD59-A6C34878D82A}">
+                    <a16:rowId xmlns:a16="http://schemas.microsoft.com/office/drawing/2014/main" val="10003"/>
+                  </a:ext>
+                </a:extLst>
               </a:tr>
               <a:tr h="370840">
                 <a:tc>
@@ -3834,6 +3890,11 @@
                   </a:txBody>
                   <a:tcPr/>
                 </a:tc>
+                <a:extLst>
+                  <a:ext uri="{0D108BD9-81ED-4DB2-BD59-A6C34878D82A}">
+                    <a16:rowId xmlns:a16="http://schemas.microsoft.com/office/drawing/2014/main" val="10004"/>
+                  </a:ext>
+                </a:extLst>
               </a:tr>
               <a:tr h="370840">
                 <a:tc>
@@ -3984,6 +4045,11 @@
                   </a:txBody>
                   <a:tcPr/>
                 </a:tc>
+                <a:extLst>
+                  <a:ext uri="{0D108BD9-81ED-4DB2-BD59-A6C34878D82A}">
+                    <a16:rowId xmlns:a16="http://schemas.microsoft.com/office/drawing/2014/main" val="10005"/>
+                  </a:ext>
+                </a:extLst>
               </a:tr>
               <a:tr h="370840">
                 <a:tc>
@@ -4148,6 +4214,11 @@
                   </a:txBody>
                   <a:tcPr/>
                 </a:tc>
+                <a:extLst>
+                  <a:ext uri="{0D108BD9-81ED-4DB2-BD59-A6C34878D82A}">
+                    <a16:rowId xmlns:a16="http://schemas.microsoft.com/office/drawing/2014/main" val="10006"/>
+                  </a:ext>
+                </a:extLst>
               </a:tr>
               <a:tr h="370840">
                 <a:tc>
@@ -4304,6 +4375,11 @@
                   </a:txBody>
                   <a:tcPr/>
                 </a:tc>
+                <a:extLst>
+                  <a:ext uri="{0D108BD9-81ED-4DB2-BD59-A6C34878D82A}">
+                    <a16:rowId xmlns:a16="http://schemas.microsoft.com/office/drawing/2014/main" val="10007"/>
+                  </a:ext>
+                </a:extLst>
               </a:tr>
             </a:tbl>
           </a:graphicData>
@@ -4332,13 +4408,8 @@
           <a:p>
             <a:r>
               <a:rPr lang="en-US" dirty="0" smtClean="0"/>
-              <a:t>Title: Average FAR and FRR for all Activities for all users using original features from filtered </a:t>
+              <a:t>Title: Average FAR and FRR for all Activities for all users using original features from filtered data with SVMs</a:t>
             </a:r>
-            <a:r>
-              <a:rPr lang="en-US" dirty="0" smtClean="0"/>
-              <a:t>data with SVMs</a:t>
-            </a:r>
-            <a:endParaRPr lang="en-US" dirty="0" smtClean="0"/>
           </a:p>
         </p:txBody>
       </p:sp>
@@ -4402,11 +4473,7 @@
           <a:p>
             <a:r>
               <a:rPr lang="en-US" dirty="0" smtClean="0"/>
-              <a:t>Title: Average FAR and FRR for all Activities for all users using original features from non-filtered data with </a:t>
-            </a:r>
-            <a:r>
-              <a:rPr lang="en-US" dirty="0" smtClean="0"/>
-              <a:t>SVMs</a:t>
+              <a:t>Title: Average FAR and FRR for all Activities for all users using original features from non-filtered data with SVMs</a:t>
             </a:r>
             <a:endParaRPr lang="en-US" dirty="0"/>
           </a:p>
@@ -4437,12 +4504,48 @@
                 <a:tableStyleId>{5C22544A-7EE6-4342-B048-85BDC9FD1C3A}</a:tableStyleId>
               </a:tblPr>
               <a:tblGrid>
-                <a:gridCol w="2631776"/>
-                <a:gridCol w="1680247"/>
-                <a:gridCol w="1685365"/>
-                <a:gridCol w="1748118"/>
-                <a:gridCol w="1550894"/>
-                <a:gridCol w="1712258"/>
+                <a:gridCol w="2631776">
+                  <a:extLst>
+                    <a:ext uri="{9D8B030D-6E8A-4147-A177-3AD203B41FA5}">
+                      <a16:colId xmlns:a16="http://schemas.microsoft.com/office/drawing/2014/main" val="20000"/>
+                    </a:ext>
+                  </a:extLst>
+                </a:gridCol>
+                <a:gridCol w="1680247">
+                  <a:extLst>
+                    <a:ext uri="{9D8B030D-6E8A-4147-A177-3AD203B41FA5}">
+                      <a16:colId xmlns:a16="http://schemas.microsoft.com/office/drawing/2014/main" val="20001"/>
+                    </a:ext>
+                  </a:extLst>
+                </a:gridCol>
+                <a:gridCol w="1685365">
+                  <a:extLst>
+                    <a:ext uri="{9D8B030D-6E8A-4147-A177-3AD203B41FA5}">
+                      <a16:colId xmlns:a16="http://schemas.microsoft.com/office/drawing/2014/main" val="20002"/>
+                    </a:ext>
+                  </a:extLst>
+                </a:gridCol>
+                <a:gridCol w="1748118">
+                  <a:extLst>
+                    <a:ext uri="{9D8B030D-6E8A-4147-A177-3AD203B41FA5}">
+                      <a16:colId xmlns:a16="http://schemas.microsoft.com/office/drawing/2014/main" val="20003"/>
+                    </a:ext>
+                  </a:extLst>
+                </a:gridCol>
+                <a:gridCol w="1550894">
+                  <a:extLst>
+                    <a:ext uri="{9D8B030D-6E8A-4147-A177-3AD203B41FA5}">
+                      <a16:colId xmlns:a16="http://schemas.microsoft.com/office/drawing/2014/main" val="20004"/>
+                    </a:ext>
+                  </a:extLst>
+                </a:gridCol>
+                <a:gridCol w="1712258">
+                  <a:extLst>
+                    <a:ext uri="{9D8B030D-6E8A-4147-A177-3AD203B41FA5}">
+                      <a16:colId xmlns:a16="http://schemas.microsoft.com/office/drawing/2014/main" val="20005"/>
+                    </a:ext>
+                  </a:extLst>
+                </a:gridCol>
               </a:tblGrid>
               <a:tr h="370840">
                 <a:tc>
@@ -4562,6 +4665,11 @@
                   </a:txBody>
                   <a:tcPr/>
                 </a:tc>
+                <a:extLst>
+                  <a:ext uri="{0D108BD9-81ED-4DB2-BD59-A6C34878D82A}">
+                    <a16:rowId xmlns:a16="http://schemas.microsoft.com/office/drawing/2014/main" val="10000"/>
+                  </a:ext>
+                </a:extLst>
               </a:tr>
               <a:tr h="370840">
                 <a:tc>
@@ -4712,6 +4820,11 @@
                   </a:txBody>
                   <a:tcPr/>
                 </a:tc>
+                <a:extLst>
+                  <a:ext uri="{0D108BD9-81ED-4DB2-BD59-A6C34878D82A}">
+                    <a16:rowId xmlns:a16="http://schemas.microsoft.com/office/drawing/2014/main" val="10001"/>
+                  </a:ext>
+                </a:extLst>
               </a:tr>
               <a:tr h="370840">
                 <a:tc>
@@ -4862,6 +4975,11 @@
                   </a:txBody>
                   <a:tcPr/>
                 </a:tc>
+                <a:extLst>
+                  <a:ext uri="{0D108BD9-81ED-4DB2-BD59-A6C34878D82A}">
+                    <a16:rowId xmlns:a16="http://schemas.microsoft.com/office/drawing/2014/main" val="10002"/>
+                  </a:ext>
+                </a:extLst>
               </a:tr>
               <a:tr h="370840">
                 <a:tc>
@@ -5012,6 +5130,11 @@
                   </a:txBody>
                   <a:tcPr/>
                 </a:tc>
+                <a:extLst>
+                  <a:ext uri="{0D108BD9-81ED-4DB2-BD59-A6C34878D82A}">
+                    <a16:rowId xmlns:a16="http://schemas.microsoft.com/office/drawing/2014/main" val="10003"/>
+                  </a:ext>
+                </a:extLst>
               </a:tr>
               <a:tr h="370840">
                 <a:tc>
@@ -5162,6 +5285,11 @@
                   </a:txBody>
                   <a:tcPr/>
                 </a:tc>
+                <a:extLst>
+                  <a:ext uri="{0D108BD9-81ED-4DB2-BD59-A6C34878D82A}">
+                    <a16:rowId xmlns:a16="http://schemas.microsoft.com/office/drawing/2014/main" val="10004"/>
+                  </a:ext>
+                </a:extLst>
               </a:tr>
               <a:tr h="576916">
                 <a:tc>
@@ -5312,6 +5440,11 @@
                   </a:txBody>
                   <a:tcPr/>
                 </a:tc>
+                <a:extLst>
+                  <a:ext uri="{0D108BD9-81ED-4DB2-BD59-A6C34878D82A}">
+                    <a16:rowId xmlns:a16="http://schemas.microsoft.com/office/drawing/2014/main" val="10005"/>
+                  </a:ext>
+                </a:extLst>
               </a:tr>
               <a:tr h="370840">
                 <a:tc>
@@ -5476,6 +5609,11 @@
                   </a:txBody>
                   <a:tcPr/>
                 </a:tc>
+                <a:extLst>
+                  <a:ext uri="{0D108BD9-81ED-4DB2-BD59-A6C34878D82A}">
+                    <a16:rowId xmlns:a16="http://schemas.microsoft.com/office/drawing/2014/main" val="10006"/>
+                  </a:ext>
+                </a:extLst>
               </a:tr>
               <a:tr h="370840">
                 <a:tc>
@@ -5632,6 +5770,11 @@
                   </a:txBody>
                   <a:tcPr/>
                 </a:tc>
+                <a:extLst>
+                  <a:ext uri="{0D108BD9-81ED-4DB2-BD59-A6C34878D82A}">
+                    <a16:rowId xmlns:a16="http://schemas.microsoft.com/office/drawing/2014/main" val="10007"/>
+                  </a:ext>
+                </a:extLst>
               </a:tr>
             </a:tbl>
           </a:graphicData>
@@ -5705,11 +5848,7 @@
             </a:r>
             <a:r>
               <a:rPr lang="en-US" dirty="0" smtClean="0"/>
-              <a:t>ctivities for all users using 40 PCs from features of filtered data with </a:t>
-            </a:r>
-            <a:r>
-              <a:rPr lang="en-US" dirty="0" smtClean="0"/>
-              <a:t>SVMs</a:t>
+              <a:t>ctivities for all users using 40 PCs from features of filtered data with SVMs</a:t>
             </a:r>
             <a:endParaRPr lang="en-US" dirty="0"/>
           </a:p>
@@ -5740,12 +5879,48 @@
                 <a:tableStyleId>{5C22544A-7EE6-4342-B048-85BDC9FD1C3A}</a:tableStyleId>
               </a:tblPr>
               <a:tblGrid>
-                <a:gridCol w="2631776"/>
-                <a:gridCol w="1680247"/>
-                <a:gridCol w="1685365"/>
-                <a:gridCol w="1748118"/>
-                <a:gridCol w="1550894"/>
-                <a:gridCol w="1712258"/>
+                <a:gridCol w="2631776">
+                  <a:extLst>
+                    <a:ext uri="{9D8B030D-6E8A-4147-A177-3AD203B41FA5}">
+                      <a16:colId xmlns:a16="http://schemas.microsoft.com/office/drawing/2014/main" val="20000"/>
+                    </a:ext>
+                  </a:extLst>
+                </a:gridCol>
+                <a:gridCol w="1680247">
+                  <a:extLst>
+                    <a:ext uri="{9D8B030D-6E8A-4147-A177-3AD203B41FA5}">
+                      <a16:colId xmlns:a16="http://schemas.microsoft.com/office/drawing/2014/main" val="20001"/>
+                    </a:ext>
+                  </a:extLst>
+                </a:gridCol>
+                <a:gridCol w="1685365">
+                  <a:extLst>
+                    <a:ext uri="{9D8B030D-6E8A-4147-A177-3AD203B41FA5}">
+                      <a16:colId xmlns:a16="http://schemas.microsoft.com/office/drawing/2014/main" val="20002"/>
+                    </a:ext>
+                  </a:extLst>
+                </a:gridCol>
+                <a:gridCol w="1748118">
+                  <a:extLst>
+                    <a:ext uri="{9D8B030D-6E8A-4147-A177-3AD203B41FA5}">
+                      <a16:colId xmlns:a16="http://schemas.microsoft.com/office/drawing/2014/main" val="20003"/>
+                    </a:ext>
+                  </a:extLst>
+                </a:gridCol>
+                <a:gridCol w="1550894">
+                  <a:extLst>
+                    <a:ext uri="{9D8B030D-6E8A-4147-A177-3AD203B41FA5}">
+                      <a16:colId xmlns:a16="http://schemas.microsoft.com/office/drawing/2014/main" val="20004"/>
+                    </a:ext>
+                  </a:extLst>
+                </a:gridCol>
+                <a:gridCol w="1712258">
+                  <a:extLst>
+                    <a:ext uri="{9D8B030D-6E8A-4147-A177-3AD203B41FA5}">
+                      <a16:colId xmlns:a16="http://schemas.microsoft.com/office/drawing/2014/main" val="20005"/>
+                    </a:ext>
+                  </a:extLst>
+                </a:gridCol>
               </a:tblGrid>
               <a:tr h="370840">
                 <a:tc>
@@ -5865,6 +6040,11 @@
                   </a:txBody>
                   <a:tcPr/>
                 </a:tc>
+                <a:extLst>
+                  <a:ext uri="{0D108BD9-81ED-4DB2-BD59-A6C34878D82A}">
+                    <a16:rowId xmlns:a16="http://schemas.microsoft.com/office/drawing/2014/main" val="10000"/>
+                  </a:ext>
+                </a:extLst>
               </a:tr>
               <a:tr h="564366">
                 <a:tc>
@@ -6015,6 +6195,11 @@
                   </a:txBody>
                   <a:tcPr/>
                 </a:tc>
+                <a:extLst>
+                  <a:ext uri="{0D108BD9-81ED-4DB2-BD59-A6C34878D82A}">
+                    <a16:rowId xmlns:a16="http://schemas.microsoft.com/office/drawing/2014/main" val="10001"/>
+                  </a:ext>
+                </a:extLst>
               </a:tr>
               <a:tr h="370840">
                 <a:tc>
@@ -6165,6 +6350,11 @@
                   </a:txBody>
                   <a:tcPr/>
                 </a:tc>
+                <a:extLst>
+                  <a:ext uri="{0D108BD9-81ED-4DB2-BD59-A6C34878D82A}">
+                    <a16:rowId xmlns:a16="http://schemas.microsoft.com/office/drawing/2014/main" val="10002"/>
+                  </a:ext>
+                </a:extLst>
               </a:tr>
               <a:tr h="370840">
                 <a:tc>
@@ -6315,6 +6505,11 @@
                   </a:txBody>
                   <a:tcPr/>
                 </a:tc>
+                <a:extLst>
+                  <a:ext uri="{0D108BD9-81ED-4DB2-BD59-A6C34878D82A}">
+                    <a16:rowId xmlns:a16="http://schemas.microsoft.com/office/drawing/2014/main" val="10003"/>
+                  </a:ext>
+                </a:extLst>
               </a:tr>
               <a:tr h="370840">
                 <a:tc>
@@ -6465,6 +6660,11 @@
                   </a:txBody>
                   <a:tcPr/>
                 </a:tc>
+                <a:extLst>
+                  <a:ext uri="{0D108BD9-81ED-4DB2-BD59-A6C34878D82A}">
+                    <a16:rowId xmlns:a16="http://schemas.microsoft.com/office/drawing/2014/main" val="10004"/>
+                  </a:ext>
+                </a:extLst>
               </a:tr>
               <a:tr h="370840">
                 <a:tc>
@@ -6615,6 +6815,11 @@
                   </a:txBody>
                   <a:tcPr/>
                 </a:tc>
+                <a:extLst>
+                  <a:ext uri="{0D108BD9-81ED-4DB2-BD59-A6C34878D82A}">
+                    <a16:rowId xmlns:a16="http://schemas.microsoft.com/office/drawing/2014/main" val="10005"/>
+                  </a:ext>
+                </a:extLst>
               </a:tr>
               <a:tr h="370840">
                 <a:tc>
@@ -6779,6 +6984,11 @@
                   </a:txBody>
                   <a:tcPr/>
                 </a:tc>
+                <a:extLst>
+                  <a:ext uri="{0D108BD9-81ED-4DB2-BD59-A6C34878D82A}">
+                    <a16:rowId xmlns:a16="http://schemas.microsoft.com/office/drawing/2014/main" val="10006"/>
+                  </a:ext>
+                </a:extLst>
               </a:tr>
               <a:tr h="370840">
                 <a:tc>
@@ -6935,6 +7145,11 @@
                   </a:txBody>
                   <a:tcPr/>
                 </a:tc>
+                <a:extLst>
+                  <a:ext uri="{0D108BD9-81ED-4DB2-BD59-A6C34878D82A}">
+                    <a16:rowId xmlns:a16="http://schemas.microsoft.com/office/drawing/2014/main" val="10007"/>
+                  </a:ext>
+                </a:extLst>
               </a:tr>
             </a:tbl>
           </a:graphicData>
@@ -7008,11 +7223,7 @@
             </a:r>
             <a:r>
               <a:rPr lang="en-US" dirty="0" smtClean="0"/>
-              <a:t>ctivities for all users using 40 PCs from features of non-filtered data with </a:t>
-            </a:r>
-            <a:r>
-              <a:rPr lang="en-US" dirty="0" smtClean="0"/>
-              <a:t>SVMs</a:t>
+              <a:t>ctivities for all users using 40 PCs from features of non-filtered data with SVMs</a:t>
             </a:r>
             <a:endParaRPr lang="en-US" dirty="0"/>
           </a:p>
@@ -7043,12 +7254,48 @@
                 <a:tableStyleId>{5C22544A-7EE6-4342-B048-85BDC9FD1C3A}</a:tableStyleId>
               </a:tblPr>
               <a:tblGrid>
-                <a:gridCol w="2631776"/>
-                <a:gridCol w="1680247"/>
-                <a:gridCol w="1685365"/>
-                <a:gridCol w="1748118"/>
-                <a:gridCol w="1550894"/>
-                <a:gridCol w="1712258"/>
+                <a:gridCol w="2631776">
+                  <a:extLst>
+                    <a:ext uri="{9D8B030D-6E8A-4147-A177-3AD203B41FA5}">
+                      <a16:colId xmlns:a16="http://schemas.microsoft.com/office/drawing/2014/main" val="20000"/>
+                    </a:ext>
+                  </a:extLst>
+                </a:gridCol>
+                <a:gridCol w="1680247">
+                  <a:extLst>
+                    <a:ext uri="{9D8B030D-6E8A-4147-A177-3AD203B41FA5}">
+                      <a16:colId xmlns:a16="http://schemas.microsoft.com/office/drawing/2014/main" val="20001"/>
+                    </a:ext>
+                  </a:extLst>
+                </a:gridCol>
+                <a:gridCol w="1685365">
+                  <a:extLst>
+                    <a:ext uri="{9D8B030D-6E8A-4147-A177-3AD203B41FA5}">
+                      <a16:colId xmlns:a16="http://schemas.microsoft.com/office/drawing/2014/main" val="20002"/>
+                    </a:ext>
+                  </a:extLst>
+                </a:gridCol>
+                <a:gridCol w="1748118">
+                  <a:extLst>
+                    <a:ext uri="{9D8B030D-6E8A-4147-A177-3AD203B41FA5}">
+                      <a16:colId xmlns:a16="http://schemas.microsoft.com/office/drawing/2014/main" val="20003"/>
+                    </a:ext>
+                  </a:extLst>
+                </a:gridCol>
+                <a:gridCol w="1550894">
+                  <a:extLst>
+                    <a:ext uri="{9D8B030D-6E8A-4147-A177-3AD203B41FA5}">
+                      <a16:colId xmlns:a16="http://schemas.microsoft.com/office/drawing/2014/main" val="20004"/>
+                    </a:ext>
+                  </a:extLst>
+                </a:gridCol>
+                <a:gridCol w="1712258">
+                  <a:extLst>
+                    <a:ext uri="{9D8B030D-6E8A-4147-A177-3AD203B41FA5}">
+                      <a16:colId xmlns:a16="http://schemas.microsoft.com/office/drawing/2014/main" val="20005"/>
+                    </a:ext>
+                  </a:extLst>
+                </a:gridCol>
               </a:tblGrid>
               <a:tr h="370840">
                 <a:tc>
@@ -7168,6 +7415,11 @@
                   </a:txBody>
                   <a:tcPr/>
                 </a:tc>
+                <a:extLst>
+                  <a:ext uri="{0D108BD9-81ED-4DB2-BD59-A6C34878D82A}">
+                    <a16:rowId xmlns:a16="http://schemas.microsoft.com/office/drawing/2014/main" val="10000"/>
+                  </a:ext>
+                </a:extLst>
               </a:tr>
               <a:tr h="370840">
                 <a:tc>
@@ -7318,6 +7570,11 @@
                   </a:txBody>
                   <a:tcPr/>
                 </a:tc>
+                <a:extLst>
+                  <a:ext uri="{0D108BD9-81ED-4DB2-BD59-A6C34878D82A}">
+                    <a16:rowId xmlns:a16="http://schemas.microsoft.com/office/drawing/2014/main" val="10001"/>
+                  </a:ext>
+                </a:extLst>
               </a:tr>
               <a:tr h="370840">
                 <a:tc>
@@ -7461,13 +7718,15 @@
                         </a:rPr>
                         <a:t>FAR: 0.05183</a:t>
                       </a:r>
-                      <a:endParaRPr lang="en-US" dirty="0" smtClean="0">
-                        <a:latin typeface="+mn-lt"/>
-                      </a:endParaRPr>
-                    </a:p>
-                  </a:txBody>
-                  <a:tcPr/>
-                </a:tc>
+                    </a:p>
+                  </a:txBody>
+                  <a:tcPr/>
+                </a:tc>
+                <a:extLst>
+                  <a:ext uri="{0D108BD9-81ED-4DB2-BD59-A6C34878D82A}">
+                    <a16:rowId xmlns:a16="http://schemas.microsoft.com/office/drawing/2014/main" val="10002"/>
+                  </a:ext>
+                </a:extLst>
               </a:tr>
               <a:tr h="593053">
                 <a:tc>
@@ -7611,13 +7870,15 @@
                         </a:rPr>
                         <a:t>FAR: 0.04117</a:t>
                       </a:r>
-                      <a:endParaRPr lang="en-US" dirty="0" smtClean="0">
-                        <a:latin typeface="+mn-lt"/>
-                      </a:endParaRPr>
-                    </a:p>
-                  </a:txBody>
-                  <a:tcPr/>
-                </a:tc>
+                    </a:p>
+                  </a:txBody>
+                  <a:tcPr/>
+                </a:tc>
+                <a:extLst>
+                  <a:ext uri="{0D108BD9-81ED-4DB2-BD59-A6C34878D82A}">
+                    <a16:rowId xmlns:a16="http://schemas.microsoft.com/office/drawing/2014/main" val="10003"/>
+                  </a:ext>
+                </a:extLst>
               </a:tr>
               <a:tr h="370840">
                 <a:tc>
@@ -7761,13 +8022,15 @@
                         </a:rPr>
                         <a:t>FAR: 0.02142</a:t>
                       </a:r>
-                      <a:endParaRPr lang="en-US" dirty="0" smtClean="0">
-                        <a:latin typeface="+mn-lt"/>
-                      </a:endParaRPr>
-                    </a:p>
-                  </a:txBody>
-                  <a:tcPr/>
-                </a:tc>
+                    </a:p>
+                  </a:txBody>
+                  <a:tcPr/>
+                </a:tc>
+                <a:extLst>
+                  <a:ext uri="{0D108BD9-81ED-4DB2-BD59-A6C34878D82A}">
+                    <a16:rowId xmlns:a16="http://schemas.microsoft.com/office/drawing/2014/main" val="10004"/>
+                  </a:ext>
+                </a:extLst>
               </a:tr>
               <a:tr h="370840">
                 <a:tc>
@@ -7911,13 +8174,15 @@
                         </a:rPr>
                         <a:t>FAR: 0.01514</a:t>
                       </a:r>
-                      <a:endParaRPr lang="en-US" dirty="0" smtClean="0">
-                        <a:latin typeface="+mn-lt"/>
-                      </a:endParaRPr>
-                    </a:p>
-                  </a:txBody>
-                  <a:tcPr/>
-                </a:tc>
+                    </a:p>
+                  </a:txBody>
+                  <a:tcPr/>
+                </a:tc>
+                <a:extLst>
+                  <a:ext uri="{0D108BD9-81ED-4DB2-BD59-A6C34878D82A}">
+                    <a16:rowId xmlns:a16="http://schemas.microsoft.com/office/drawing/2014/main" val="10005"/>
+                  </a:ext>
+                </a:extLst>
               </a:tr>
               <a:tr h="370840">
                 <a:tc>
@@ -8075,13 +8340,15 @@
                         </a:rPr>
                         <a:t>FAR: 0.02220</a:t>
                       </a:r>
-                      <a:endParaRPr lang="en-US" dirty="0" smtClean="0">
-                        <a:latin typeface="+mn-lt"/>
-                      </a:endParaRPr>
-                    </a:p>
-                  </a:txBody>
-                  <a:tcPr/>
-                </a:tc>
+                    </a:p>
+                  </a:txBody>
+                  <a:tcPr/>
+                </a:tc>
+                <a:extLst>
+                  <a:ext uri="{0D108BD9-81ED-4DB2-BD59-A6C34878D82A}">
+                    <a16:rowId xmlns:a16="http://schemas.microsoft.com/office/drawing/2014/main" val="10006"/>
+                  </a:ext>
+                </a:extLst>
               </a:tr>
               <a:tr h="370840">
                 <a:tc>
@@ -8231,13 +8498,15 @@
                         </a:rPr>
                         <a:t>FAR: 0.02949</a:t>
                       </a:r>
-                      <a:endParaRPr lang="en-US" dirty="0" smtClean="0">
-                        <a:latin typeface="+mn-lt"/>
-                      </a:endParaRPr>
-                    </a:p>
-                  </a:txBody>
-                  <a:tcPr/>
-                </a:tc>
+                    </a:p>
+                  </a:txBody>
+                  <a:tcPr/>
+                </a:tc>
+                <a:extLst>
+                  <a:ext uri="{0D108BD9-81ED-4DB2-BD59-A6C34878D82A}">
+                    <a16:rowId xmlns:a16="http://schemas.microsoft.com/office/drawing/2014/main" val="10007"/>
+                  </a:ext>
+                </a:extLst>
               </a:tr>
             </a:tbl>
           </a:graphicData>
@@ -8311,11 +8580,7 @@
             </a:r>
             <a:r>
               <a:rPr lang="en-US" dirty="0" smtClean="0"/>
-              <a:t>ctivities for all users using 57 PCs from features of filtered data </a:t>
-            </a:r>
-            <a:r>
-              <a:rPr lang="en-US" dirty="0" smtClean="0"/>
-              <a:t>with SVMs</a:t>
+              <a:t>ctivities for all users using 57 PCs from features of filtered data with SVMs</a:t>
             </a:r>
             <a:endParaRPr lang="en-US" dirty="0"/>
           </a:p>
@@ -8346,12 +8611,48 @@
                 <a:tableStyleId>{5C22544A-7EE6-4342-B048-85BDC9FD1C3A}</a:tableStyleId>
               </a:tblPr>
               <a:tblGrid>
-                <a:gridCol w="2631776"/>
-                <a:gridCol w="1680247"/>
-                <a:gridCol w="1685365"/>
-                <a:gridCol w="1748118"/>
-                <a:gridCol w="1550894"/>
-                <a:gridCol w="1712258"/>
+                <a:gridCol w="2631776">
+                  <a:extLst>
+                    <a:ext uri="{9D8B030D-6E8A-4147-A177-3AD203B41FA5}">
+                      <a16:colId xmlns:a16="http://schemas.microsoft.com/office/drawing/2014/main" val="20000"/>
+                    </a:ext>
+                  </a:extLst>
+                </a:gridCol>
+                <a:gridCol w="1680247">
+                  <a:extLst>
+                    <a:ext uri="{9D8B030D-6E8A-4147-A177-3AD203B41FA5}">
+                      <a16:colId xmlns:a16="http://schemas.microsoft.com/office/drawing/2014/main" val="20001"/>
+                    </a:ext>
+                  </a:extLst>
+                </a:gridCol>
+                <a:gridCol w="1685365">
+                  <a:extLst>
+                    <a:ext uri="{9D8B030D-6E8A-4147-A177-3AD203B41FA5}">
+                      <a16:colId xmlns:a16="http://schemas.microsoft.com/office/drawing/2014/main" val="20002"/>
+                    </a:ext>
+                  </a:extLst>
+                </a:gridCol>
+                <a:gridCol w="1748118">
+                  <a:extLst>
+                    <a:ext uri="{9D8B030D-6E8A-4147-A177-3AD203B41FA5}">
+                      <a16:colId xmlns:a16="http://schemas.microsoft.com/office/drawing/2014/main" val="20003"/>
+                    </a:ext>
+                  </a:extLst>
+                </a:gridCol>
+                <a:gridCol w="1550894">
+                  <a:extLst>
+                    <a:ext uri="{9D8B030D-6E8A-4147-A177-3AD203B41FA5}">
+                      <a16:colId xmlns:a16="http://schemas.microsoft.com/office/drawing/2014/main" val="20004"/>
+                    </a:ext>
+                  </a:extLst>
+                </a:gridCol>
+                <a:gridCol w="1712258">
+                  <a:extLst>
+                    <a:ext uri="{9D8B030D-6E8A-4147-A177-3AD203B41FA5}">
+                      <a16:colId xmlns:a16="http://schemas.microsoft.com/office/drawing/2014/main" val="20005"/>
+                    </a:ext>
+                  </a:extLst>
+                </a:gridCol>
               </a:tblGrid>
               <a:tr h="370840">
                 <a:tc>
@@ -8471,6 +8772,11 @@
                   </a:txBody>
                   <a:tcPr/>
                 </a:tc>
+                <a:extLst>
+                  <a:ext uri="{0D108BD9-81ED-4DB2-BD59-A6C34878D82A}">
+                    <a16:rowId xmlns:a16="http://schemas.microsoft.com/office/drawing/2014/main" val="10000"/>
+                  </a:ext>
+                </a:extLst>
               </a:tr>
               <a:tr h="370840">
                 <a:tc>
@@ -8620,13 +8926,15 @@
                         </a:rPr>
                         <a:t>FAR: 0.04286</a:t>
                       </a:r>
-                      <a:endParaRPr lang="en-US" dirty="0" smtClean="0">
-                        <a:latin typeface="+mn-lt"/>
-                      </a:endParaRPr>
-                    </a:p>
-                  </a:txBody>
-                  <a:tcPr/>
-                </a:tc>
+                    </a:p>
+                  </a:txBody>
+                  <a:tcPr/>
+                </a:tc>
+                <a:extLst>
+                  <a:ext uri="{0D108BD9-81ED-4DB2-BD59-A6C34878D82A}">
+                    <a16:rowId xmlns:a16="http://schemas.microsoft.com/office/drawing/2014/main" val="10001"/>
+                  </a:ext>
+                </a:extLst>
               </a:tr>
               <a:tr h="370840">
                 <a:tc>
@@ -8761,13 +9069,15 @@
                         </a:rPr>
                         <a:t>FAR: 0.04248</a:t>
                       </a:r>
-                      <a:endParaRPr lang="en-US" dirty="0" smtClean="0">
-                        <a:latin typeface="+mn-lt"/>
-                      </a:endParaRPr>
-                    </a:p>
-                  </a:txBody>
-                  <a:tcPr/>
-                </a:tc>
+                    </a:p>
+                  </a:txBody>
+                  <a:tcPr/>
+                </a:tc>
+                <a:extLst>
+                  <a:ext uri="{0D108BD9-81ED-4DB2-BD59-A6C34878D82A}">
+                    <a16:rowId xmlns:a16="http://schemas.microsoft.com/office/drawing/2014/main" val="10002"/>
+                  </a:ext>
+                </a:extLst>
               </a:tr>
               <a:tr h="370840">
                 <a:tc>
@@ -8902,13 +9212,15 @@
                         </a:rPr>
                         <a:t>FAR: 0.05832</a:t>
                       </a:r>
-                      <a:endParaRPr lang="en-US" dirty="0" smtClean="0">
-                        <a:latin typeface="+mn-lt"/>
-                      </a:endParaRPr>
-                    </a:p>
-                  </a:txBody>
-                  <a:tcPr/>
-                </a:tc>
+                    </a:p>
+                  </a:txBody>
+                  <a:tcPr/>
+                </a:tc>
+                <a:extLst>
+                  <a:ext uri="{0D108BD9-81ED-4DB2-BD59-A6C34878D82A}">
+                    <a16:rowId xmlns:a16="http://schemas.microsoft.com/office/drawing/2014/main" val="10003"/>
+                  </a:ext>
+                </a:extLst>
               </a:tr>
               <a:tr h="370840">
                 <a:tc>
@@ -9043,13 +9355,15 @@
                         </a:rPr>
                         <a:t>FAR: 0.05827</a:t>
                       </a:r>
-                      <a:endParaRPr lang="en-US" dirty="0" smtClean="0">
-                        <a:latin typeface="+mn-lt"/>
-                      </a:endParaRPr>
-                    </a:p>
-                  </a:txBody>
-                  <a:tcPr/>
-                </a:tc>
+                    </a:p>
+                  </a:txBody>
+                  <a:tcPr/>
+                </a:tc>
+                <a:extLst>
+                  <a:ext uri="{0D108BD9-81ED-4DB2-BD59-A6C34878D82A}">
+                    <a16:rowId xmlns:a16="http://schemas.microsoft.com/office/drawing/2014/main" val="10004"/>
+                  </a:ext>
+                </a:extLst>
               </a:tr>
               <a:tr h="370840">
                 <a:tc>
@@ -9184,13 +9498,15 @@
                         </a:rPr>
                         <a:t>FAR: 0.01430</a:t>
                       </a:r>
-                      <a:endParaRPr lang="en-US" dirty="0" smtClean="0">
-                        <a:latin typeface="+mn-lt"/>
-                      </a:endParaRPr>
-                    </a:p>
-                  </a:txBody>
-                  <a:tcPr/>
-                </a:tc>
+                    </a:p>
+                  </a:txBody>
+                  <a:tcPr/>
+                </a:tc>
+                <a:extLst>
+                  <a:ext uri="{0D108BD9-81ED-4DB2-BD59-A6C34878D82A}">
+                    <a16:rowId xmlns:a16="http://schemas.microsoft.com/office/drawing/2014/main" val="10005"/>
+                  </a:ext>
+                </a:extLst>
               </a:tr>
               <a:tr h="370840">
                 <a:tc>
@@ -9339,13 +9655,15 @@
                         </a:rPr>
                         <a:t>FAR: 0.02904</a:t>
                       </a:r>
-                      <a:endParaRPr lang="en-US" dirty="0" smtClean="0">
-                        <a:latin typeface="+mn-lt"/>
-                      </a:endParaRPr>
-                    </a:p>
-                  </a:txBody>
-                  <a:tcPr/>
-                </a:tc>
+                    </a:p>
+                  </a:txBody>
+                  <a:tcPr/>
+                </a:tc>
+                <a:extLst>
+                  <a:ext uri="{0D108BD9-81ED-4DB2-BD59-A6C34878D82A}">
+                    <a16:rowId xmlns:a16="http://schemas.microsoft.com/office/drawing/2014/main" val="10006"/>
+                  </a:ext>
+                </a:extLst>
               </a:tr>
               <a:tr h="370840">
                 <a:tc>
@@ -9486,13 +9804,15 @@
                         </a:rPr>
                         <a:t>FAR: 0.04088</a:t>
                       </a:r>
-                      <a:endParaRPr lang="en-US" dirty="0" smtClean="0">
-                        <a:latin typeface="+mn-lt"/>
-                      </a:endParaRPr>
-                    </a:p>
-                  </a:txBody>
-                  <a:tcPr/>
-                </a:tc>
+                    </a:p>
+                  </a:txBody>
+                  <a:tcPr/>
+                </a:tc>
+                <a:extLst>
+                  <a:ext uri="{0D108BD9-81ED-4DB2-BD59-A6C34878D82A}">
+                    <a16:rowId xmlns:a16="http://schemas.microsoft.com/office/drawing/2014/main" val="10007"/>
+                  </a:ext>
+                </a:extLst>
               </a:tr>
             </a:tbl>
           </a:graphicData>
@@ -9566,11 +9886,7 @@
             </a:r>
             <a:r>
               <a:rPr lang="en-US" dirty="0" smtClean="0"/>
-              <a:t>ctivities for all users using 57 PCs from features of non-filtered data with </a:t>
-            </a:r>
-            <a:r>
-              <a:rPr lang="en-US" dirty="0" smtClean="0"/>
-              <a:t>SVMs</a:t>
+              <a:t>ctivities for all users using 57 PCs from features of non-filtered data with SVMs</a:t>
             </a:r>
             <a:endParaRPr lang="en-US" dirty="0"/>
           </a:p>
@@ -9585,7 +9901,7 @@
           <p:nvPr>
             <p:extLst>
               <p:ext uri="{D42A27DB-BD31-4B8C-83A1-F6EECF244321}">
-                <p14:modId xmlns:p14="http://schemas.microsoft.com/office/powerpoint/2010/main" val="677426252"/>
+                <p14:modId xmlns:p14="http://schemas.microsoft.com/office/powerpoint/2010/main" val="3385200954"/>
               </p:ext>
             </p:extLst>
           </p:nvPr>
@@ -9601,12 +9917,48 @@
                 <a:tableStyleId>{5C22544A-7EE6-4342-B048-85BDC9FD1C3A}</a:tableStyleId>
               </a:tblPr>
               <a:tblGrid>
-                <a:gridCol w="2631776"/>
-                <a:gridCol w="1680247"/>
-                <a:gridCol w="1685365"/>
-                <a:gridCol w="1748118"/>
-                <a:gridCol w="1550894"/>
-                <a:gridCol w="1712258"/>
+                <a:gridCol w="2631776">
+                  <a:extLst>
+                    <a:ext uri="{9D8B030D-6E8A-4147-A177-3AD203B41FA5}">
+                      <a16:colId xmlns:a16="http://schemas.microsoft.com/office/drawing/2014/main" val="20000"/>
+                    </a:ext>
+                  </a:extLst>
+                </a:gridCol>
+                <a:gridCol w="1680247">
+                  <a:extLst>
+                    <a:ext uri="{9D8B030D-6E8A-4147-A177-3AD203B41FA5}">
+                      <a16:colId xmlns:a16="http://schemas.microsoft.com/office/drawing/2014/main" val="20001"/>
+                    </a:ext>
+                  </a:extLst>
+                </a:gridCol>
+                <a:gridCol w="1685365">
+                  <a:extLst>
+                    <a:ext uri="{9D8B030D-6E8A-4147-A177-3AD203B41FA5}">
+                      <a16:colId xmlns:a16="http://schemas.microsoft.com/office/drawing/2014/main" val="20002"/>
+                    </a:ext>
+                  </a:extLst>
+                </a:gridCol>
+                <a:gridCol w="1748118">
+                  <a:extLst>
+                    <a:ext uri="{9D8B030D-6E8A-4147-A177-3AD203B41FA5}">
+                      <a16:colId xmlns:a16="http://schemas.microsoft.com/office/drawing/2014/main" val="20003"/>
+                    </a:ext>
+                  </a:extLst>
+                </a:gridCol>
+                <a:gridCol w="1550894">
+                  <a:extLst>
+                    <a:ext uri="{9D8B030D-6E8A-4147-A177-3AD203B41FA5}">
+                      <a16:colId xmlns:a16="http://schemas.microsoft.com/office/drawing/2014/main" val="20004"/>
+                    </a:ext>
+                  </a:extLst>
+                </a:gridCol>
+                <a:gridCol w="1712258">
+                  <a:extLst>
+                    <a:ext uri="{9D8B030D-6E8A-4147-A177-3AD203B41FA5}">
+                      <a16:colId xmlns:a16="http://schemas.microsoft.com/office/drawing/2014/main" val="20005"/>
+                    </a:ext>
+                  </a:extLst>
+                </a:gridCol>
               </a:tblGrid>
               <a:tr h="370840">
                 <a:tc>
@@ -9726,6 +10078,11 @@
                   </a:txBody>
                   <a:tcPr/>
                 </a:tc>
+                <a:extLst>
+                  <a:ext uri="{0D108BD9-81ED-4DB2-BD59-A6C34878D82A}">
+                    <a16:rowId xmlns:a16="http://schemas.microsoft.com/office/drawing/2014/main" val="10000"/>
+                  </a:ext>
+                </a:extLst>
               </a:tr>
               <a:tr h="370840">
                 <a:tc>
@@ -9755,33 +10112,33 @@
                         <a:rPr lang="en-US" dirty="0" smtClean="0">
                           <a:latin typeface="+mn-lt"/>
                         </a:rPr>
-                        <a:t>FRR: 0.23214</a:t>
-                      </a:r>
-                    </a:p>
-                    <a:p>
-                      <a:r>
-                        <a:rPr lang="en-US" dirty="0" smtClean="0">
-                          <a:latin typeface="+mn-lt"/>
-                        </a:rPr>
-                        <a:t>FAR: 0.03713</a:t>
-                      </a:r>
-                      <a:endParaRPr lang="en-US" dirty="0">
-                        <a:latin typeface="+mn-lt"/>
-                      </a:endParaRPr>
-                    </a:p>
-                  </a:txBody>
-                  <a:tcPr/>
-                </a:tc>
-                <a:tc>
-                  <a:txBody>
-                    <a:bodyPr/>
-                    <a:lstStyle/>
-                    <a:p>
-                      <a:r>
-                        <a:rPr lang="en-US" dirty="0" smtClean="0">
-                          <a:latin typeface="+mn-lt"/>
-                        </a:rPr>
-                        <a:t>FRR: 0.65789</a:t>
+                        <a:t>FRR: 0.29114</a:t>
+                      </a:r>
+                    </a:p>
+                    <a:p>
+                      <a:r>
+                        <a:rPr lang="en-US" dirty="0" smtClean="0">
+                          <a:latin typeface="+mn-lt"/>
+                        </a:rPr>
+                        <a:t>FAR: 0.04181</a:t>
+                      </a:r>
+                      <a:endParaRPr lang="en-US" dirty="0">
+                        <a:latin typeface="+mn-lt"/>
+                      </a:endParaRPr>
+                    </a:p>
+                  </a:txBody>
+                  <a:tcPr/>
+                </a:tc>
+                <a:tc>
+                  <a:txBody>
+                    <a:bodyPr/>
+                    <a:lstStyle/>
+                    <a:p>
+                      <a:r>
+                        <a:rPr lang="en-US" dirty="0" smtClean="0">
+                          <a:latin typeface="+mn-lt"/>
+                        </a:rPr>
+                        <a:t>FRR: 0.57895</a:t>
                       </a:r>
                     </a:p>
                     <a:p>
@@ -9815,25 +10172,25 @@
                         <a:rPr lang="en-US" dirty="0" smtClean="0">
                           <a:latin typeface="+mn-lt"/>
                         </a:rPr>
-                        <a:t>FAR: 0.03037</a:t>
-                      </a:r>
-                      <a:endParaRPr lang="en-US" dirty="0">
-                        <a:latin typeface="+mn-lt"/>
-                      </a:endParaRPr>
-                    </a:p>
-                  </a:txBody>
-                  <a:tcPr/>
-                </a:tc>
-                <a:tc>
-                  <a:txBody>
-                    <a:bodyPr/>
-                    <a:lstStyle/>
-                    <a:p>
-                      <a:r>
-                        <a:rPr lang="en-US" dirty="0" smtClean="0">
-                          <a:latin typeface="+mn-lt"/>
-                        </a:rPr>
-                        <a:t>FRR: 0.51249</a:t>
+                        <a:t>FAR: 0.03271</a:t>
+                      </a:r>
+                      <a:endParaRPr lang="en-US" dirty="0">
+                        <a:latin typeface="+mn-lt"/>
+                      </a:endParaRPr>
+                    </a:p>
+                  </a:txBody>
+                  <a:tcPr/>
+                </a:tc>
+                <a:tc>
+                  <a:txBody>
+                    <a:bodyPr/>
+                    <a:lstStyle/>
+                    <a:p>
+                      <a:r>
+                        <a:rPr lang="en-US" dirty="0" smtClean="0">
+                          <a:latin typeface="+mn-lt"/>
+                        </a:rPr>
+                        <a:t>FRR: 0.48750</a:t>
                       </a:r>
                     </a:p>
                     <a:p>
@@ -9876,6 +10233,11 @@
                   </a:txBody>
                   <a:tcPr/>
                 </a:tc>
+                <a:extLst>
+                  <a:ext uri="{0D108BD9-81ED-4DB2-BD59-A6C34878D82A}">
+                    <a16:rowId xmlns:a16="http://schemas.microsoft.com/office/drawing/2014/main" val="10001"/>
+                  </a:ext>
+                </a:extLst>
               </a:tr>
               <a:tr h="370840">
                 <a:tc>
@@ -9905,93 +10267,93 @@
                         <a:rPr lang="en-US" dirty="0" smtClean="0">
                           <a:latin typeface="+mn-lt"/>
                         </a:rPr>
-                        <a:t>FRR: 0.30802</a:t>
-                      </a:r>
-                    </a:p>
-                    <a:p>
-                      <a:r>
-                        <a:rPr lang="en-US" dirty="0" smtClean="0">
-                          <a:latin typeface="+mn-lt"/>
-                        </a:rPr>
-                        <a:t>FAR: 0.05546</a:t>
-                      </a:r>
-                      <a:endParaRPr lang="en-US" dirty="0">
-                        <a:latin typeface="+mn-lt"/>
-                      </a:endParaRPr>
-                    </a:p>
-                  </a:txBody>
-                  <a:tcPr/>
-                </a:tc>
-                <a:tc>
-                  <a:txBody>
-                    <a:bodyPr/>
-                    <a:lstStyle/>
-                    <a:p>
-                      <a:r>
-                        <a:rPr lang="en-US" dirty="0" smtClean="0">
-                          <a:latin typeface="+mn-lt"/>
-                        </a:rPr>
-                        <a:t>FRR: 0.67442</a:t>
-                      </a:r>
-                    </a:p>
-                    <a:p>
-                      <a:r>
-                        <a:rPr lang="en-US" dirty="0" smtClean="0">
-                          <a:latin typeface="+mn-lt"/>
-                        </a:rPr>
-                        <a:t>FAR: 0.125</a:t>
-                      </a:r>
-                      <a:endParaRPr lang="en-US" dirty="0">
-                        <a:latin typeface="+mn-lt"/>
-                      </a:endParaRPr>
-                    </a:p>
-                  </a:txBody>
-                  <a:tcPr/>
-                </a:tc>
-                <a:tc>
-                  <a:txBody>
-                    <a:bodyPr/>
-                    <a:lstStyle/>
-                    <a:p>
-                      <a:r>
-                        <a:rPr lang="en-US" dirty="0" smtClean="0">
-                          <a:latin typeface="+mn-lt"/>
-                        </a:rPr>
-                        <a:t>FRR: 0.10526</a:t>
-                      </a:r>
-                    </a:p>
-                    <a:p>
-                      <a:r>
-                        <a:rPr lang="en-US" dirty="0" smtClean="0">
-                          <a:latin typeface="+mn-lt"/>
-                        </a:rPr>
-                        <a:t>FAR: 0.13452</a:t>
-                      </a:r>
-                      <a:endParaRPr lang="en-US" dirty="0">
-                        <a:latin typeface="+mn-lt"/>
-                      </a:endParaRPr>
-                    </a:p>
-                  </a:txBody>
-                  <a:tcPr/>
-                </a:tc>
-                <a:tc>
-                  <a:txBody>
-                    <a:bodyPr/>
-                    <a:lstStyle/>
-                    <a:p>
-                      <a:r>
-                        <a:rPr lang="en-US" dirty="0" smtClean="0">
-                          <a:latin typeface="+mn-lt"/>
-                        </a:rPr>
-                        <a:t>FRR: 0.15625</a:t>
-                      </a:r>
-                    </a:p>
-                    <a:p>
-                      <a:r>
-                        <a:rPr lang="en-US" dirty="0" smtClean="0">
-                          <a:latin typeface="+mn-lt"/>
-                        </a:rPr>
-                        <a:t>FAR: 0.0615</a:t>
+                        <a:t>FRR: 0.08571</a:t>
+                      </a:r>
+                    </a:p>
+                    <a:p>
+                      <a:r>
+                        <a:rPr lang="en-US" dirty="0" smtClean="0">
+                          <a:latin typeface="+mn-lt"/>
+                        </a:rPr>
+                        <a:t>FAR: 0.07131</a:t>
+                      </a:r>
+                      <a:endParaRPr lang="en-US" dirty="0">
+                        <a:latin typeface="+mn-lt"/>
+                      </a:endParaRPr>
+                    </a:p>
+                  </a:txBody>
+                  <a:tcPr/>
+                </a:tc>
+                <a:tc>
+                  <a:txBody>
+                    <a:bodyPr/>
+                    <a:lstStyle/>
+                    <a:p>
+                      <a:r>
+                        <a:rPr lang="en-US" dirty="0" smtClean="0">
+                          <a:latin typeface="+mn-lt"/>
+                        </a:rPr>
+                        <a:t>FRR: 0.66279</a:t>
+                      </a:r>
+                    </a:p>
+                    <a:p>
+                      <a:r>
+                        <a:rPr lang="en-US" dirty="0" smtClean="0">
+                          <a:latin typeface="+mn-lt"/>
+                        </a:rPr>
+                        <a:t>FAR: 0.11170</a:t>
+                      </a:r>
+                      <a:endParaRPr lang="en-US" dirty="0">
+                        <a:latin typeface="+mn-lt"/>
+                      </a:endParaRPr>
+                    </a:p>
+                  </a:txBody>
+                  <a:tcPr/>
+                </a:tc>
+                <a:tc>
+                  <a:txBody>
+                    <a:bodyPr/>
+                    <a:lstStyle/>
+                    <a:p>
+                      <a:r>
+                        <a:rPr lang="en-US" dirty="0" smtClean="0">
+                          <a:latin typeface="+mn-lt"/>
+                        </a:rPr>
+                        <a:t>FRR: 0.07368</a:t>
+                      </a:r>
+                    </a:p>
+                    <a:p>
+                      <a:r>
+                        <a:rPr lang="en-US" dirty="0" smtClean="0">
+                          <a:latin typeface="+mn-lt"/>
+                        </a:rPr>
+                        <a:t>FAR: 0.14721</a:t>
+                      </a:r>
+                      <a:endParaRPr lang="en-US" dirty="0">
+                        <a:latin typeface="+mn-lt"/>
+                      </a:endParaRPr>
+                    </a:p>
+                  </a:txBody>
+                  <a:tcPr/>
+                </a:tc>
+                <a:tc>
+                  <a:txBody>
+                    <a:bodyPr/>
+                    <a:lstStyle/>
+                    <a:p>
+                      <a:r>
+                        <a:rPr lang="en-US" dirty="0" smtClean="0">
+                          <a:latin typeface="+mn-lt"/>
+                        </a:rPr>
+                        <a:t>FRR: 0.11458</a:t>
+                      </a:r>
+                    </a:p>
+                    <a:p>
+                      <a:r>
+                        <a:rPr lang="en-US" dirty="0" smtClean="0">
+                          <a:latin typeface="+mn-lt"/>
+                        </a:rPr>
+                        <a:t>FAR: 0.07062</a:t>
                       </a:r>
                       <a:endParaRPr lang="en-US" dirty="0">
                         <a:latin typeface="+mn-lt"/>
@@ -10019,13 +10381,15 @@
                         </a:rPr>
                         <a:t>FAR: 0.04673</a:t>
                       </a:r>
-                      <a:endParaRPr lang="en-US" dirty="0" smtClean="0">
-                        <a:latin typeface="+mn-lt"/>
-                      </a:endParaRPr>
-                    </a:p>
-                  </a:txBody>
-                  <a:tcPr/>
-                </a:tc>
+                    </a:p>
+                  </a:txBody>
+                  <a:tcPr/>
+                </a:tc>
+                <a:extLst>
+                  <a:ext uri="{0D108BD9-81ED-4DB2-BD59-A6C34878D82A}">
+                    <a16:rowId xmlns:a16="http://schemas.microsoft.com/office/drawing/2014/main" val="10002"/>
+                  </a:ext>
+                </a:extLst>
               </a:tr>
               <a:tr h="370840">
                 <a:tc>
@@ -10055,93 +10419,93 @@
                         <a:rPr lang="en-US" dirty="0" smtClean="0">
                           <a:latin typeface="+mn-lt"/>
                         </a:rPr>
-                        <a:t>FRR: 0.08163</a:t>
-                      </a:r>
-                    </a:p>
-                    <a:p>
-                      <a:r>
-                        <a:rPr lang="en-US" dirty="0" smtClean="0">
-                          <a:latin typeface="+mn-lt"/>
-                        </a:rPr>
-                        <a:t>FAR: 0.08333</a:t>
-                      </a:r>
-                      <a:endParaRPr lang="en-US" dirty="0">
-                        <a:latin typeface="+mn-lt"/>
-                      </a:endParaRPr>
-                    </a:p>
-                  </a:txBody>
-                  <a:tcPr/>
-                </a:tc>
-                <a:tc>
-                  <a:txBody>
-                    <a:bodyPr/>
-                    <a:lstStyle/>
-                    <a:p>
-                      <a:r>
-                        <a:rPr lang="en-US" dirty="0" smtClean="0">
-                          <a:latin typeface="+mn-lt"/>
-                        </a:rPr>
-                        <a:t>FRR: 0.41333</a:t>
-                      </a:r>
-                    </a:p>
-                    <a:p>
-                      <a:r>
-                        <a:rPr lang="en-US" dirty="0" smtClean="0">
-                          <a:latin typeface="+mn-lt"/>
-                        </a:rPr>
-                        <a:t>FAR: 0.24806</a:t>
-                      </a:r>
-                      <a:endParaRPr lang="en-US" dirty="0">
-                        <a:latin typeface="+mn-lt"/>
-                      </a:endParaRPr>
-                    </a:p>
-                  </a:txBody>
-                  <a:tcPr/>
-                </a:tc>
-                <a:tc>
-                  <a:txBody>
-                    <a:bodyPr/>
-                    <a:lstStyle/>
-                    <a:p>
-                      <a:r>
-                        <a:rPr lang="en-US" dirty="0" smtClean="0">
-                          <a:latin typeface="+mn-lt"/>
-                        </a:rPr>
-                        <a:t>FRR: 0.7093</a:t>
-                      </a:r>
-                    </a:p>
-                    <a:p>
-                      <a:r>
-                        <a:rPr lang="en-US" dirty="0" smtClean="0">
-                          <a:latin typeface="+mn-lt"/>
-                        </a:rPr>
-                        <a:t>FAR: 0.09181</a:t>
-                      </a:r>
-                      <a:endParaRPr lang="en-US" dirty="0">
-                        <a:latin typeface="+mn-lt"/>
-                      </a:endParaRPr>
-                    </a:p>
-                  </a:txBody>
-                  <a:tcPr/>
-                </a:tc>
-                <a:tc>
-                  <a:txBody>
-                    <a:bodyPr/>
-                    <a:lstStyle/>
-                    <a:p>
-                      <a:r>
-                        <a:rPr lang="en-US" dirty="0" smtClean="0">
-                          <a:latin typeface="+mn-lt"/>
-                        </a:rPr>
-                        <a:t>FRR: 0.48684</a:t>
-                      </a:r>
-                    </a:p>
-                    <a:p>
-                      <a:r>
-                        <a:rPr lang="en-US" dirty="0" smtClean="0">
-                          <a:latin typeface="+mn-lt"/>
-                        </a:rPr>
-                        <a:t>FAR: 0.10022</a:t>
+                        <a:t>FRR: 0.24017</a:t>
+                      </a:r>
+                    </a:p>
+                    <a:p>
+                      <a:r>
+                        <a:rPr lang="en-US" dirty="0" smtClean="0">
+                          <a:latin typeface="+mn-lt"/>
+                        </a:rPr>
+                        <a:t>FAR: 0.02458</a:t>
+                      </a:r>
+                      <a:endParaRPr lang="en-US" dirty="0">
+                        <a:latin typeface="+mn-lt"/>
+                      </a:endParaRPr>
+                    </a:p>
+                  </a:txBody>
+                  <a:tcPr/>
+                </a:tc>
+                <a:tc>
+                  <a:txBody>
+                    <a:bodyPr/>
+                    <a:lstStyle/>
+                    <a:p>
+                      <a:r>
+                        <a:rPr lang="en-US" dirty="0" smtClean="0">
+                          <a:latin typeface="+mn-lt"/>
+                        </a:rPr>
+                        <a:t>FRR: 0.33333</a:t>
+                      </a:r>
+                    </a:p>
+                    <a:p>
+                      <a:r>
+                        <a:rPr lang="en-US" dirty="0" smtClean="0">
+                          <a:latin typeface="+mn-lt"/>
+                        </a:rPr>
+                        <a:t>FAR: 0.22739</a:t>
+                      </a:r>
+                      <a:endParaRPr lang="en-US" dirty="0">
+                        <a:latin typeface="+mn-lt"/>
+                      </a:endParaRPr>
+                    </a:p>
+                  </a:txBody>
+                  <a:tcPr/>
+                </a:tc>
+                <a:tc>
+                  <a:txBody>
+                    <a:bodyPr/>
+                    <a:lstStyle/>
+                    <a:p>
+                      <a:r>
+                        <a:rPr lang="en-US" dirty="0" smtClean="0">
+                          <a:latin typeface="+mn-lt"/>
+                        </a:rPr>
+                        <a:t>FRR: 0.58140</a:t>
+                      </a:r>
+                    </a:p>
+                    <a:p>
+                      <a:r>
+                        <a:rPr lang="en-US" dirty="0" smtClean="0">
+                          <a:latin typeface="+mn-lt"/>
+                        </a:rPr>
+                        <a:t>FAR: 0.07196</a:t>
+                      </a:r>
+                      <a:endParaRPr lang="en-US" dirty="0" smtClean="0">
+                        <a:latin typeface="+mn-lt"/>
+                      </a:endParaRPr>
+                    </a:p>
+                  </a:txBody>
+                  <a:tcPr/>
+                </a:tc>
+                <a:tc>
+                  <a:txBody>
+                    <a:bodyPr/>
+                    <a:lstStyle/>
+                    <a:p>
+                      <a:r>
+                        <a:rPr lang="en-US" dirty="0" smtClean="0">
+                          <a:latin typeface="+mn-lt"/>
+                        </a:rPr>
+                        <a:t>FRR: 0.50000</a:t>
+                      </a:r>
+                    </a:p>
+                    <a:p>
+                      <a:r>
+                        <a:rPr lang="en-US" dirty="0" smtClean="0">
+                          <a:latin typeface="+mn-lt"/>
+                        </a:rPr>
+                        <a:t>FAR: 0.06318</a:t>
                       </a:r>
                       <a:endParaRPr lang="en-US" dirty="0">
                         <a:latin typeface="+mn-lt"/>
@@ -10169,13 +10533,15 @@
                         </a:rPr>
                         <a:t>FAR: 0.05060</a:t>
                       </a:r>
-                      <a:endParaRPr lang="en-US" dirty="0" smtClean="0">
-                        <a:latin typeface="+mn-lt"/>
-                      </a:endParaRPr>
-                    </a:p>
-                  </a:txBody>
-                  <a:tcPr/>
-                </a:tc>
+                    </a:p>
+                  </a:txBody>
+                  <a:tcPr/>
+                </a:tc>
+                <a:extLst>
+                  <a:ext uri="{0D108BD9-81ED-4DB2-BD59-A6C34878D82A}">
+                    <a16:rowId xmlns:a16="http://schemas.microsoft.com/office/drawing/2014/main" val="10003"/>
+                  </a:ext>
+                </a:extLst>
               </a:tr>
               <a:tr h="370840">
                 <a:tc>
@@ -10205,59 +10571,59 @@
                         <a:rPr lang="en-US" dirty="0" smtClean="0">
                           <a:latin typeface="+mn-lt"/>
                         </a:rPr>
-                        <a:t>FRR: 0.25764</a:t>
-                      </a:r>
-                    </a:p>
-                    <a:p>
-                      <a:r>
-                        <a:rPr lang="en-US" dirty="0" smtClean="0">
-                          <a:latin typeface="+mn-lt"/>
-                        </a:rPr>
-                        <a:t>FAR: 0.03305</a:t>
-                      </a:r>
-                      <a:endParaRPr lang="en-US" dirty="0">
-                        <a:latin typeface="+mn-lt"/>
-                      </a:endParaRPr>
-                    </a:p>
-                  </a:txBody>
-                  <a:tcPr/>
-                </a:tc>
-                <a:tc>
-                  <a:txBody>
-                    <a:bodyPr/>
-                    <a:lstStyle/>
-                    <a:p>
-                      <a:r>
-                        <a:rPr lang="en-US" dirty="0" smtClean="0">
-                          <a:latin typeface="+mn-lt"/>
-                        </a:rPr>
-                        <a:t>FRR: 0.85915</a:t>
-                      </a:r>
-                    </a:p>
-                    <a:p>
-                      <a:r>
-                        <a:rPr lang="en-US" dirty="0" smtClean="0">
-                          <a:latin typeface="+mn-lt"/>
-                        </a:rPr>
-                        <a:t>FAR: 0.06138</a:t>
-                      </a:r>
-                      <a:endParaRPr lang="en-US" dirty="0">
-                        <a:latin typeface="+mn-lt"/>
-                      </a:endParaRPr>
-                    </a:p>
-                  </a:txBody>
-                  <a:tcPr/>
-                </a:tc>
-                <a:tc>
-                  <a:txBody>
-                    <a:bodyPr/>
-                    <a:lstStyle/>
-                    <a:p>
-                      <a:r>
-                        <a:rPr lang="en-US" dirty="0" smtClean="0">
-                          <a:latin typeface="+mn-lt"/>
-                        </a:rPr>
-                        <a:t>FRR: 0.42353</a:t>
+                        <a:t>FRR: 0.24000</a:t>
+                      </a:r>
+                    </a:p>
+                    <a:p>
+                      <a:r>
+                        <a:rPr lang="en-US" dirty="0" smtClean="0">
+                          <a:latin typeface="+mn-lt"/>
+                        </a:rPr>
+                        <a:t>FAR: 0.03463</a:t>
+                      </a:r>
+                      <a:endParaRPr lang="en-US" dirty="0">
+                        <a:latin typeface="+mn-lt"/>
+                      </a:endParaRPr>
+                    </a:p>
+                  </a:txBody>
+                  <a:tcPr/>
+                </a:tc>
+                <a:tc>
+                  <a:txBody>
+                    <a:bodyPr/>
+                    <a:lstStyle/>
+                    <a:p>
+                      <a:r>
+                        <a:rPr lang="en-US" dirty="0" smtClean="0">
+                          <a:latin typeface="+mn-lt"/>
+                        </a:rPr>
+                        <a:t>FRR: 0.73239</a:t>
+                      </a:r>
+                    </a:p>
+                    <a:p>
+                      <a:r>
+                        <a:rPr lang="en-US" dirty="0" smtClean="0">
+                          <a:latin typeface="+mn-lt"/>
+                        </a:rPr>
+                        <a:t>FAR: 0.04348</a:t>
+                      </a:r>
+                      <a:endParaRPr lang="en-US" dirty="0">
+                        <a:latin typeface="+mn-lt"/>
+                      </a:endParaRPr>
+                    </a:p>
+                  </a:txBody>
+                  <a:tcPr/>
+                </a:tc>
+                <a:tc>
+                  <a:txBody>
+                    <a:bodyPr/>
+                    <a:lstStyle/>
+                    <a:p>
+                      <a:r>
+                        <a:rPr lang="en-US" dirty="0" smtClean="0">
+                          <a:latin typeface="+mn-lt"/>
+                        </a:rPr>
+                        <a:t>FRR: 0.44706</a:t>
                       </a:r>
                     </a:p>
                     <a:p>
@@ -10283,15 +10649,15 @@
                         <a:rPr lang="en-US" dirty="0" smtClean="0">
                           <a:latin typeface="+mn-lt"/>
                         </a:rPr>
-                        <a:t>FRR: 0.61798</a:t>
-                      </a:r>
-                    </a:p>
-                    <a:p>
-                      <a:r>
-                        <a:rPr lang="en-US" dirty="0" smtClean="0">
-                          <a:latin typeface="+mn-lt"/>
-                        </a:rPr>
-                        <a:t>FAR: 0.08296</a:t>
+                        <a:t>FRR: 0.58427</a:t>
+                      </a:r>
+                    </a:p>
+                    <a:p>
+                      <a:r>
+                        <a:rPr lang="en-US" dirty="0" smtClean="0">
+                          <a:latin typeface="+mn-lt"/>
+                        </a:rPr>
+                        <a:t>FAR: 0.08072</a:t>
                       </a:r>
                       <a:endParaRPr lang="en-US" dirty="0">
                         <a:latin typeface="+mn-lt"/>
@@ -10319,13 +10685,15 @@
                         </a:rPr>
                         <a:t>FAR: 0.02913</a:t>
                       </a:r>
-                      <a:endParaRPr lang="en-US" dirty="0" smtClean="0">
-                        <a:latin typeface="+mn-lt"/>
-                      </a:endParaRPr>
-                    </a:p>
-                  </a:txBody>
-                  <a:tcPr/>
-                </a:tc>
+                    </a:p>
+                  </a:txBody>
+                  <a:tcPr/>
+                </a:tc>
+                <a:extLst>
+                  <a:ext uri="{0D108BD9-81ED-4DB2-BD59-A6C34878D82A}">
+                    <a16:rowId xmlns:a16="http://schemas.microsoft.com/office/drawing/2014/main" val="10004"/>
+                  </a:ext>
+                </a:extLst>
               </a:tr>
               <a:tr h="370840">
                 <a:tc>
@@ -10355,93 +10723,93 @@
                         <a:rPr lang="en-US" dirty="0" smtClean="0">
                           <a:latin typeface="+mn-lt"/>
                         </a:rPr>
-                        <a:t>FRR: 0.28889</a:t>
-                      </a:r>
-                    </a:p>
-                    <a:p>
-                      <a:r>
-                        <a:rPr lang="en-US" dirty="0" smtClean="0">
-                          <a:latin typeface="+mn-lt"/>
-                        </a:rPr>
-                        <a:t>FAR: 0.02027</a:t>
-                      </a:r>
-                      <a:endParaRPr lang="en-US" dirty="0">
-                        <a:latin typeface="+mn-lt"/>
-                      </a:endParaRPr>
-                    </a:p>
-                  </a:txBody>
-                  <a:tcPr/>
-                </a:tc>
-                <a:tc>
-                  <a:txBody>
-                    <a:bodyPr/>
-                    <a:lstStyle/>
-                    <a:p>
-                      <a:r>
-                        <a:rPr lang="en-US" dirty="0" smtClean="0">
-                          <a:latin typeface="+mn-lt"/>
-                        </a:rPr>
-                        <a:t>FRR: 0.79104</a:t>
-                      </a:r>
-                    </a:p>
-                    <a:p>
-                      <a:r>
-                        <a:rPr lang="en-US" dirty="0" smtClean="0">
-                          <a:latin typeface="+mn-lt"/>
-                        </a:rPr>
-                        <a:t>FAR: 0.03291</a:t>
-                      </a:r>
-                      <a:endParaRPr lang="en-US" dirty="0">
-                        <a:latin typeface="+mn-lt"/>
-                      </a:endParaRPr>
-                    </a:p>
-                  </a:txBody>
-                  <a:tcPr/>
-                </a:tc>
-                <a:tc>
-                  <a:txBody>
-                    <a:bodyPr/>
-                    <a:lstStyle/>
-                    <a:p>
-                      <a:r>
-                        <a:rPr lang="en-US" dirty="0" smtClean="0">
-                          <a:latin typeface="+mn-lt"/>
-                        </a:rPr>
-                        <a:t>FRR: 0.76389</a:t>
-                      </a:r>
-                    </a:p>
-                    <a:p>
-                      <a:r>
-                        <a:rPr lang="en-US" dirty="0" smtClean="0">
-                          <a:latin typeface="+mn-lt"/>
-                        </a:rPr>
-                        <a:t>FAR: 0.04796</a:t>
-                      </a:r>
-                      <a:endParaRPr lang="en-US" dirty="0">
-                        <a:latin typeface="+mn-lt"/>
-                      </a:endParaRPr>
-                    </a:p>
-                  </a:txBody>
-                  <a:tcPr/>
-                </a:tc>
-                <a:tc>
-                  <a:txBody>
-                    <a:bodyPr/>
-                    <a:lstStyle/>
-                    <a:p>
-                      <a:r>
-                        <a:rPr lang="en-US" dirty="0" smtClean="0">
-                          <a:latin typeface="+mn-lt"/>
-                        </a:rPr>
-                        <a:t>FRR: 0.6087</a:t>
-                      </a:r>
-                    </a:p>
-                    <a:p>
-                      <a:r>
-                        <a:rPr lang="en-US" dirty="0" smtClean="0">
-                          <a:latin typeface="+mn-lt"/>
-                        </a:rPr>
-                        <a:t>FAR: 0.01717</a:t>
+                        <a:t>FRR: 0.11647</a:t>
+                      </a:r>
+                    </a:p>
+                    <a:p>
+                      <a:r>
+                        <a:rPr lang="en-US" dirty="0" smtClean="0">
+                          <a:latin typeface="+mn-lt"/>
+                        </a:rPr>
+                        <a:t>FAR: 0.01379</a:t>
+                      </a:r>
+                      <a:endParaRPr lang="en-US" dirty="0">
+                        <a:latin typeface="+mn-lt"/>
+                      </a:endParaRPr>
+                    </a:p>
+                  </a:txBody>
+                  <a:tcPr/>
+                </a:tc>
+                <a:tc>
+                  <a:txBody>
+                    <a:bodyPr/>
+                    <a:lstStyle/>
+                    <a:p>
+                      <a:r>
+                        <a:rPr lang="en-US" dirty="0" smtClean="0">
+                          <a:latin typeface="+mn-lt"/>
+                        </a:rPr>
+                        <a:t>FRR: 0.65672</a:t>
+                      </a:r>
+                    </a:p>
+                    <a:p>
+                      <a:r>
+                        <a:rPr lang="en-US" dirty="0" smtClean="0">
+                          <a:latin typeface="+mn-lt"/>
+                        </a:rPr>
+                        <a:t>FAR: 0.03038</a:t>
+                      </a:r>
+                      <a:endParaRPr lang="en-US" dirty="0">
+                        <a:latin typeface="+mn-lt"/>
+                      </a:endParaRPr>
+                    </a:p>
+                  </a:txBody>
+                  <a:tcPr/>
+                </a:tc>
+                <a:tc>
+                  <a:txBody>
+                    <a:bodyPr/>
+                    <a:lstStyle/>
+                    <a:p>
+                      <a:r>
+                        <a:rPr lang="en-US" dirty="0" smtClean="0">
+                          <a:latin typeface="+mn-lt"/>
+                        </a:rPr>
+                        <a:t>FRR: 0.81944</a:t>
+                      </a:r>
+                    </a:p>
+                    <a:p>
+                      <a:r>
+                        <a:rPr lang="en-US" dirty="0" smtClean="0">
+                          <a:latin typeface="+mn-lt"/>
+                        </a:rPr>
+                        <a:t>FAR: 0.02638</a:t>
+                      </a:r>
+                      <a:endParaRPr lang="en-US" dirty="0">
+                        <a:latin typeface="+mn-lt"/>
+                      </a:endParaRPr>
+                    </a:p>
+                  </a:txBody>
+                  <a:tcPr/>
+                </a:tc>
+                <a:tc>
+                  <a:txBody>
+                    <a:bodyPr/>
+                    <a:lstStyle/>
+                    <a:p>
+                      <a:r>
+                        <a:rPr lang="en-US" dirty="0" smtClean="0">
+                          <a:latin typeface="+mn-lt"/>
+                        </a:rPr>
+                        <a:t>FRR: 0.69565</a:t>
+                      </a:r>
+                    </a:p>
+                    <a:p>
+                      <a:r>
+                        <a:rPr lang="en-US" dirty="0" smtClean="0">
+                          <a:latin typeface="+mn-lt"/>
+                        </a:rPr>
+                        <a:t>FAR: 0.02790</a:t>
                       </a:r>
                       <a:endParaRPr lang="en-US" dirty="0">
                         <a:latin typeface="+mn-lt"/>
@@ -10469,13 +10837,15 @@
                         </a:rPr>
                         <a:t>FAR: 0.01934</a:t>
                       </a:r>
-                      <a:endParaRPr lang="en-US" dirty="0" smtClean="0">
-                        <a:latin typeface="+mn-lt"/>
-                      </a:endParaRPr>
-                    </a:p>
-                  </a:txBody>
-                  <a:tcPr/>
-                </a:tc>
+                    </a:p>
+                  </a:txBody>
+                  <a:tcPr/>
+                </a:tc>
+                <a:extLst>
+                  <a:ext uri="{0D108BD9-81ED-4DB2-BD59-A6C34878D82A}">
+                    <a16:rowId xmlns:a16="http://schemas.microsoft.com/office/drawing/2014/main" val="10005"/>
+                  </a:ext>
+                </a:extLst>
               </a:tr>
               <a:tr h="370840">
                 <a:tc>
@@ -10519,93 +10889,93 @@
                         <a:rPr lang="en-US" dirty="0" smtClean="0">
                           <a:latin typeface="+mn-lt"/>
                         </a:rPr>
-                        <a:t>FRR: 0.13253</a:t>
-                      </a:r>
-                    </a:p>
-                    <a:p>
-                      <a:r>
-                        <a:rPr lang="en-US" dirty="0" smtClean="0">
-                          <a:latin typeface="+mn-lt"/>
-                        </a:rPr>
-                        <a:t>FAR: 0.02845</a:t>
-                      </a:r>
-                      <a:endParaRPr lang="en-US" dirty="0">
-                        <a:latin typeface="+mn-lt"/>
-                      </a:endParaRPr>
-                    </a:p>
-                  </a:txBody>
-                  <a:tcPr/>
-                </a:tc>
-                <a:tc>
-                  <a:txBody>
-                    <a:bodyPr/>
-                    <a:lstStyle/>
-                    <a:p>
-                      <a:r>
-                        <a:rPr lang="en-US" dirty="0" smtClean="0">
-                          <a:latin typeface="+mn-lt"/>
-                        </a:rPr>
-                        <a:t>FRR: 0.24138</a:t>
-                      </a:r>
-                    </a:p>
-                    <a:p>
-                      <a:r>
-                        <a:rPr lang="en-US" dirty="0" smtClean="0">
-                          <a:latin typeface="+mn-lt"/>
-                        </a:rPr>
-                        <a:t>FAR: 0.12533</a:t>
-                      </a:r>
-                      <a:endParaRPr lang="en-US" dirty="0">
-                        <a:latin typeface="+mn-lt"/>
-                      </a:endParaRPr>
-                    </a:p>
-                  </a:txBody>
-                  <a:tcPr/>
-                </a:tc>
-                <a:tc>
-                  <a:txBody>
-                    <a:bodyPr/>
-                    <a:lstStyle/>
-                    <a:p>
-                      <a:r>
-                        <a:rPr lang="en-US" dirty="0" smtClean="0">
-                          <a:latin typeface="+mn-lt"/>
-                        </a:rPr>
-                        <a:t>FRR: 0.13333</a:t>
-                      </a:r>
-                    </a:p>
-                    <a:p>
-                      <a:r>
-                        <a:rPr lang="en-US" dirty="0" smtClean="0">
-                          <a:latin typeface="+mn-lt"/>
-                        </a:rPr>
-                        <a:t>FAR: 0.15288</a:t>
-                      </a:r>
-                      <a:endParaRPr lang="en-US" dirty="0">
-                        <a:latin typeface="+mn-lt"/>
-                      </a:endParaRPr>
-                    </a:p>
-                  </a:txBody>
-                  <a:tcPr/>
-                </a:tc>
-                <a:tc>
-                  <a:txBody>
-                    <a:bodyPr/>
-                    <a:lstStyle/>
-                    <a:p>
-                      <a:r>
-                        <a:rPr lang="en-US" dirty="0" smtClean="0">
-                          <a:latin typeface="+mn-lt"/>
-                        </a:rPr>
-                        <a:t>FRR: 0.04</a:t>
-                      </a:r>
-                    </a:p>
-                    <a:p>
-                      <a:r>
-                        <a:rPr lang="en-US" dirty="0" smtClean="0">
-                          <a:latin typeface="+mn-lt"/>
-                        </a:rPr>
-                        <a:t>FAR: 0.09268</a:t>
+                        <a:t>FRR: 0.14732</a:t>
+                      </a:r>
+                    </a:p>
+                    <a:p>
+                      <a:r>
+                        <a:rPr lang="en-US" dirty="0" smtClean="0">
+                          <a:latin typeface="+mn-lt"/>
+                        </a:rPr>
+                        <a:t>FAR: 0.03629</a:t>
+                      </a:r>
+                      <a:endParaRPr lang="en-US" dirty="0">
+                        <a:latin typeface="+mn-lt"/>
+                      </a:endParaRPr>
+                    </a:p>
+                  </a:txBody>
+                  <a:tcPr/>
+                </a:tc>
+                <a:tc>
+                  <a:txBody>
+                    <a:bodyPr/>
+                    <a:lstStyle/>
+                    <a:p>
+                      <a:r>
+                        <a:rPr lang="en-US" dirty="0" smtClean="0">
+                          <a:latin typeface="+mn-lt"/>
+                        </a:rPr>
+                        <a:t>FRR: 0.19540</a:t>
+                      </a:r>
+                    </a:p>
+                    <a:p>
+                      <a:r>
+                        <a:rPr lang="en-US" dirty="0" smtClean="0">
+                          <a:latin typeface="+mn-lt"/>
+                        </a:rPr>
+                        <a:t>FAR: 0.08800</a:t>
+                      </a:r>
+                      <a:endParaRPr lang="en-US" dirty="0">
+                        <a:latin typeface="+mn-lt"/>
+                      </a:endParaRPr>
+                    </a:p>
+                  </a:txBody>
+                  <a:tcPr/>
+                </a:tc>
+                <a:tc>
+                  <a:txBody>
+                    <a:bodyPr/>
+                    <a:lstStyle/>
+                    <a:p>
+                      <a:r>
+                        <a:rPr lang="en-US" dirty="0" smtClean="0">
+                          <a:latin typeface="+mn-lt"/>
+                        </a:rPr>
+                        <a:t>FRR: 0.12222</a:t>
+                      </a:r>
+                    </a:p>
+                    <a:p>
+                      <a:r>
+                        <a:rPr lang="en-US" dirty="0" smtClean="0">
+                          <a:latin typeface="+mn-lt"/>
+                        </a:rPr>
+                        <a:t>FAR: 0.15789</a:t>
+                      </a:r>
+                      <a:endParaRPr lang="en-US" dirty="0">
+                        <a:latin typeface="+mn-lt"/>
+                      </a:endParaRPr>
+                    </a:p>
+                  </a:txBody>
+                  <a:tcPr/>
+                </a:tc>
+                <a:tc>
+                  <a:txBody>
+                    <a:bodyPr/>
+                    <a:lstStyle/>
+                    <a:p>
+                      <a:r>
+                        <a:rPr lang="en-US" dirty="0" smtClean="0">
+                          <a:latin typeface="+mn-lt"/>
+                        </a:rPr>
+                        <a:t>FRR: 0.05600</a:t>
+                      </a:r>
+                    </a:p>
+                    <a:p>
+                      <a:r>
+                        <a:rPr lang="en-US" dirty="0" smtClean="0">
+                          <a:latin typeface="+mn-lt"/>
+                        </a:rPr>
+                        <a:t>FAR: 0.11463</a:t>
                       </a:r>
                       <a:endParaRPr lang="en-US" dirty="0">
                         <a:latin typeface="+mn-lt"/>
@@ -10633,13 +11003,15 @@
                         </a:rPr>
                         <a:t>FAR: 0.02647</a:t>
                       </a:r>
-                      <a:endParaRPr lang="en-US" dirty="0" smtClean="0">
-                        <a:latin typeface="+mn-lt"/>
-                      </a:endParaRPr>
-                    </a:p>
-                  </a:txBody>
-                  <a:tcPr/>
-                </a:tc>
+                    </a:p>
+                  </a:txBody>
+                  <a:tcPr/>
+                </a:tc>
+                <a:extLst>
+                  <a:ext uri="{0D108BD9-81ED-4DB2-BD59-A6C34878D82A}">
+                    <a16:rowId xmlns:a16="http://schemas.microsoft.com/office/drawing/2014/main" val="10006"/>
+                  </a:ext>
+                </a:extLst>
               </a:tr>
               <a:tr h="370840">
                 <a:tc>
@@ -10675,93 +11047,93 @@
                         <a:rPr lang="en-US" dirty="0" smtClean="0">
                           <a:latin typeface="+mn-lt"/>
                         </a:rPr>
-                        <a:t>FRR: 0.21681</a:t>
-                      </a:r>
-                    </a:p>
-                    <a:p>
-                      <a:r>
-                        <a:rPr lang="en-US" dirty="0" smtClean="0">
-                          <a:latin typeface="+mn-lt"/>
-                        </a:rPr>
-                        <a:t>FAR: 0.04295</a:t>
-                      </a:r>
-                      <a:endParaRPr lang="en-US" dirty="0">
-                        <a:latin typeface="+mn-lt"/>
-                      </a:endParaRPr>
-                    </a:p>
-                  </a:txBody>
-                  <a:tcPr/>
-                </a:tc>
-                <a:tc>
-                  <a:txBody>
-                    <a:bodyPr/>
-                    <a:lstStyle/>
-                    <a:p>
-                      <a:r>
-                        <a:rPr lang="en-US" dirty="0" smtClean="0">
-                          <a:latin typeface="+mn-lt"/>
-                        </a:rPr>
-                        <a:t>FRR: 0.6062</a:t>
-                      </a:r>
-                    </a:p>
-                    <a:p>
-                      <a:r>
-                        <a:rPr lang="en-US" dirty="0" smtClean="0">
-                          <a:latin typeface="+mn-lt"/>
-                        </a:rPr>
-                        <a:t>FAR: 0.11907</a:t>
-                      </a:r>
-                      <a:endParaRPr lang="en-US" dirty="0">
-                        <a:latin typeface="+mn-lt"/>
-                      </a:endParaRPr>
-                    </a:p>
-                  </a:txBody>
-                  <a:tcPr/>
-                </a:tc>
-                <a:tc>
-                  <a:txBody>
-                    <a:bodyPr/>
-                    <a:lstStyle/>
-                    <a:p>
-                      <a:r>
-                        <a:rPr lang="en-US" dirty="0" smtClean="0">
-                          <a:latin typeface="+mn-lt"/>
-                        </a:rPr>
-                        <a:t>FRR: 0.46791</a:t>
-                      </a:r>
-                    </a:p>
-                    <a:p>
-                      <a:r>
-                        <a:rPr lang="en-US" dirty="0" smtClean="0">
-                          <a:latin typeface="+mn-lt"/>
-                        </a:rPr>
-                        <a:t>FAR: 0.08905</a:t>
-                      </a:r>
-                      <a:endParaRPr lang="en-US" dirty="0">
-                        <a:latin typeface="+mn-lt"/>
-                      </a:endParaRPr>
-                    </a:p>
-                  </a:txBody>
-                  <a:tcPr/>
-                </a:tc>
-                <a:tc>
-                  <a:txBody>
-                    <a:bodyPr/>
-                    <a:lstStyle/>
-                    <a:p>
-                      <a:r>
-                        <a:rPr lang="en-US" dirty="0" smtClean="0">
-                          <a:latin typeface="+mn-lt"/>
-                        </a:rPr>
-                        <a:t>FRR: 0.40371</a:t>
-                      </a:r>
-                    </a:p>
-                    <a:p>
-                      <a:r>
-                        <a:rPr lang="en-US" dirty="0" smtClean="0">
-                          <a:latin typeface="+mn-lt"/>
-                        </a:rPr>
-                        <a:t>FAR: 0.07337</a:t>
+                        <a:t>FRR: 0.18680</a:t>
+                      </a:r>
+                    </a:p>
+                    <a:p>
+                      <a:r>
+                        <a:rPr lang="en-US" dirty="0" smtClean="0">
+                          <a:latin typeface="+mn-lt"/>
+                        </a:rPr>
+                        <a:t>FAR: 0.03707</a:t>
+                      </a:r>
+                      <a:endParaRPr lang="en-US" dirty="0">
+                        <a:latin typeface="+mn-lt"/>
+                      </a:endParaRPr>
+                    </a:p>
+                  </a:txBody>
+                  <a:tcPr/>
+                </a:tc>
+                <a:tc>
+                  <a:txBody>
+                    <a:bodyPr/>
+                    <a:lstStyle/>
+                    <a:p>
+                      <a:r>
+                        <a:rPr lang="en-US" dirty="0" smtClean="0">
+                          <a:latin typeface="+mn-lt"/>
+                        </a:rPr>
+                        <a:t>FRR: 0.52660</a:t>
+                      </a:r>
+                    </a:p>
+                    <a:p>
+                      <a:r>
+                        <a:rPr lang="en-US" dirty="0" smtClean="0">
+                          <a:latin typeface="+mn-lt"/>
+                        </a:rPr>
+                        <a:t>FAR: 0.10379</a:t>
+                      </a:r>
+                      <a:endParaRPr lang="en-US" dirty="0">
+                        <a:latin typeface="+mn-lt"/>
+                      </a:endParaRPr>
+                    </a:p>
+                  </a:txBody>
+                  <a:tcPr/>
+                </a:tc>
+                <a:tc>
+                  <a:txBody>
+                    <a:bodyPr/>
+                    <a:lstStyle/>
+                    <a:p>
+                      <a:r>
+                        <a:rPr lang="en-US" dirty="0" smtClean="0">
+                          <a:latin typeface="+mn-lt"/>
+                        </a:rPr>
+                        <a:t>FRR: 0.45266</a:t>
+                      </a:r>
+                    </a:p>
+                    <a:p>
+                      <a:r>
+                        <a:rPr lang="en-US" dirty="0" smtClean="0">
+                          <a:latin typeface="+mn-lt"/>
+                        </a:rPr>
+                        <a:t>FAR: 0.08548</a:t>
+                      </a:r>
+                      <a:endParaRPr lang="en-US" dirty="0">
+                        <a:latin typeface="+mn-lt"/>
+                      </a:endParaRPr>
+                    </a:p>
+                  </a:txBody>
+                  <a:tcPr/>
+                </a:tc>
+                <a:tc>
+                  <a:txBody>
+                    <a:bodyPr/>
+                    <a:lstStyle/>
+                    <a:p>
+                      <a:r>
+                        <a:rPr lang="en-US" dirty="0" smtClean="0">
+                          <a:latin typeface="+mn-lt"/>
+                        </a:rPr>
+                        <a:t>FRR: 0.40633</a:t>
+                      </a:r>
+                    </a:p>
+                    <a:p>
+                      <a:r>
+                        <a:rPr lang="en-US" dirty="0" smtClean="0">
+                          <a:latin typeface="+mn-lt"/>
+                        </a:rPr>
+                        <a:t>FAR: 0.07379</a:t>
                       </a:r>
                       <a:endParaRPr lang="en-US" dirty="0">
                         <a:latin typeface="+mn-lt"/>
@@ -10784,18 +11156,20 @@
                     </a:p>
                     <a:p>
                       <a:r>
-                        <a:rPr lang="en-US" smtClean="0">
+                        <a:rPr lang="en-US" dirty="0" smtClean="0">
                           <a:latin typeface="+mn-lt"/>
                         </a:rPr>
                         <a:t>FAR: 0.03656</a:t>
                       </a:r>
-                      <a:endParaRPr lang="en-US" dirty="0" smtClean="0">
-                        <a:latin typeface="+mn-lt"/>
-                      </a:endParaRPr>
-                    </a:p>
-                  </a:txBody>
-                  <a:tcPr/>
-                </a:tc>
+                    </a:p>
+                  </a:txBody>
+                  <a:tcPr/>
+                </a:tc>
+                <a:extLst>
+                  <a:ext uri="{0D108BD9-81ED-4DB2-BD59-A6C34878D82A}">
+                    <a16:rowId xmlns:a16="http://schemas.microsoft.com/office/drawing/2014/main" val="10007"/>
+                  </a:ext>
+                </a:extLst>
               </a:tr>
             </a:tbl>
           </a:graphicData>

</xml_diff>